<commit_message>
Created Seasons project with functiona based component
</commit_message>
<xml_diff>
--- a/reactjs.pptx
+++ b/reactjs.pptx
@@ -3104,7 +3104,11 @@
           <a:bodyPr/>
           <a:lstStyle/>
           <a:p>
-            <a:endParaRPr lang="en-IN"/>
+            <a:r>
+              <a:rPr lang="en-IN" dirty="0" smtClean="0"/>
+              <a:t>By Chetan</a:t>
+            </a:r>
+            <a:endParaRPr lang="en-IN" dirty="0"/>
           </a:p>
         </p:txBody>
       </p:sp>
@@ -4482,11 +4486,7 @@
           <a:p>
             <a:r>
               <a:rPr lang="en-IN" sz="3100" dirty="0" smtClean="0"/>
-              <a:t>Create one more component with name </a:t>
-            </a:r>
-            <a:r>
-              <a:rPr lang="en-IN" sz="3100" dirty="0" smtClean="0"/>
-              <a:t>approval-</a:t>
+              <a:t>Create one more component with name approval-</a:t>
             </a:r>
             <a:r>
               <a:rPr lang="en-IN" sz="3100" dirty="0" err="1" smtClean="0"/>
@@ -4764,47 +4764,19 @@
                 <a:latin typeface="Courier New" pitchFamily="49" charset="0"/>
                 <a:cs typeface="Courier New" pitchFamily="49" charset="0"/>
               </a:rPr>
-              <a:t>  </a:t>
-            </a:r>
+              <a:t>      &lt;/div&gt;</a:t>
+            </a:r>
+          </a:p>
+          <a:p>
+            <a:pPr>
+              <a:buNone/>
+            </a:pPr>
             <a:r>
               <a:rPr lang="en-IN" dirty="0" smtClean="0">
                 <a:latin typeface="Courier New" pitchFamily="49" charset="0"/>
                 <a:cs typeface="Courier New" pitchFamily="49" charset="0"/>
               </a:rPr>
-              <a:t>    &lt;/</a:t>
-            </a:r>
-            <a:r>
-              <a:rPr lang="en-IN" dirty="0" smtClean="0">
-                <a:latin typeface="Courier New" pitchFamily="49" charset="0"/>
-                <a:cs typeface="Courier New" pitchFamily="49" charset="0"/>
-              </a:rPr>
-              <a:t>div&gt;</a:t>
-            </a:r>
-          </a:p>
-          <a:p>
-            <a:pPr>
-              <a:buNone/>
-            </a:pPr>
-            <a:r>
-              <a:rPr lang="en-IN" dirty="0" smtClean="0">
-                <a:latin typeface="Courier New" pitchFamily="49" charset="0"/>
-                <a:cs typeface="Courier New" pitchFamily="49" charset="0"/>
-              </a:rPr>
-              <a:t>&lt;/</a:t>
-            </a:r>
-            <a:r>
-              <a:rPr lang="en-IN" dirty="0" smtClean="0">
-                <a:latin typeface="Courier New" pitchFamily="49" charset="0"/>
-                <a:cs typeface="Courier New" pitchFamily="49" charset="0"/>
-              </a:rPr>
-              <a:t>div</a:t>
-            </a:r>
-            <a:r>
-              <a:rPr lang="en-IN" dirty="0" smtClean="0">
-                <a:latin typeface="Courier New" pitchFamily="49" charset="0"/>
-                <a:cs typeface="Courier New" pitchFamily="49" charset="0"/>
-              </a:rPr>
-              <a:t>&gt;</a:t>
+              <a:t>&lt;/div&gt;</a:t>
             </a:r>
           </a:p>
           <a:p>
@@ -4842,7 +4814,6 @@
               <a:rPr lang="en-IN" sz="6000" dirty="0" smtClean="0"/>
               <a:t> component </a:t>
             </a:r>
-            <a:endParaRPr lang="en-IN" sz="6000" dirty="0" smtClean="0"/>
           </a:p>
           <a:p>
             <a:endParaRPr lang="en-IN" dirty="0"/>
@@ -4909,7 +4880,9 @@
         </p:nvSpPr>
         <p:spPr/>
         <p:txBody>
-          <a:bodyPr/>
+          <a:bodyPr>
+            <a:normAutofit fontScale="62500" lnSpcReduction="20000"/>
+          </a:bodyPr>
           <a:lstStyle/>
           <a:p>
             <a:r>
@@ -4936,13 +4909,162 @@
             </a:r>
             <a:r>
               <a:rPr lang="en-IN" dirty="0" smtClean="0"/>
-              <a:t> in </a:t>
-            </a:r>
-            <a:r>
-              <a:rPr lang="en-IN" smtClean="0"/>
-              <a:t>index.html file</a:t>
-            </a:r>
-            <a:endParaRPr lang="en-IN"/>
+              <a:t> in index.html </a:t>
+            </a:r>
+            <a:r>
+              <a:rPr lang="en-IN" dirty="0" smtClean="0"/>
+              <a:t>file</a:t>
+            </a:r>
+          </a:p>
+          <a:p>
+            <a:r>
+              <a:rPr lang="en-IN" dirty="0" smtClean="0"/>
+              <a:t>Remove default files from sec folder</a:t>
+            </a:r>
+          </a:p>
+          <a:p>
+            <a:r>
+              <a:rPr lang="en-IN" dirty="0" smtClean="0"/>
+              <a:t>Create index.js file with react and </a:t>
+            </a:r>
+            <a:r>
+              <a:rPr lang="en-IN" dirty="0" err="1" smtClean="0"/>
+              <a:t>reactdom</a:t>
+            </a:r>
+            <a:r>
+              <a:rPr lang="en-IN" dirty="0" smtClean="0"/>
+              <a:t> libraries</a:t>
+            </a:r>
+          </a:p>
+          <a:p>
+            <a:r>
+              <a:rPr lang="en-IN" dirty="0" smtClean="0"/>
+              <a:t>Create new component with name season-</a:t>
+            </a:r>
+            <a:r>
+              <a:rPr lang="en-IN" dirty="0" err="1" smtClean="0"/>
+              <a:t>display.component.js</a:t>
+            </a:r>
+            <a:endParaRPr lang="en-IN" dirty="0" smtClean="0"/>
+          </a:p>
+          <a:p>
+            <a:r>
+              <a:rPr lang="en-IN" dirty="0" smtClean="0"/>
+              <a:t>Get user current </a:t>
+            </a:r>
+            <a:r>
+              <a:rPr lang="en-IN" dirty="0" err="1" smtClean="0"/>
+              <a:t>geolocation</a:t>
+            </a:r>
+            <a:endParaRPr lang="en-IN" dirty="0" smtClean="0"/>
+          </a:p>
+          <a:p>
+            <a:r>
+              <a:rPr lang="en-IN" dirty="0" smtClean="0"/>
+              <a:t>Add below code in index.js file in App function</a:t>
+            </a:r>
+          </a:p>
+          <a:p>
+            <a:pPr lvl="1">
+              <a:buNone/>
+            </a:pPr>
+            <a:r>
+              <a:rPr lang="en-IN" dirty="0" err="1" smtClean="0">
+                <a:latin typeface="Courier New" pitchFamily="49" charset="0"/>
+                <a:cs typeface="Courier New" pitchFamily="49" charset="0"/>
+              </a:rPr>
+              <a:t>window.navigator.geolocation.getCurrentPosition</a:t>
+            </a:r>
+            <a:r>
+              <a:rPr lang="en-IN" dirty="0" smtClean="0">
+                <a:latin typeface="Courier New" pitchFamily="49" charset="0"/>
+                <a:cs typeface="Courier New" pitchFamily="49" charset="0"/>
+              </a:rPr>
+              <a:t>(</a:t>
+            </a:r>
+          </a:p>
+          <a:p>
+            <a:pPr lvl="1">
+              <a:buNone/>
+            </a:pPr>
+            <a:r>
+              <a:rPr lang="en-IN" dirty="0" smtClean="0">
+                <a:latin typeface="Courier New" pitchFamily="49" charset="0"/>
+                <a:cs typeface="Courier New" pitchFamily="49" charset="0"/>
+              </a:rPr>
+              <a:t>    (position) =&gt; console.log(position),</a:t>
+            </a:r>
+          </a:p>
+          <a:p>
+            <a:pPr lvl="1">
+              <a:buNone/>
+            </a:pPr>
+            <a:r>
+              <a:rPr lang="en-IN" dirty="0" smtClean="0">
+                <a:latin typeface="Courier New" pitchFamily="49" charset="0"/>
+                <a:cs typeface="Courier New" pitchFamily="49" charset="0"/>
+              </a:rPr>
+              <a:t>    (err) =&gt; console.log(err)</a:t>
+            </a:r>
+          </a:p>
+          <a:p>
+            <a:pPr lvl="1">
+              <a:buNone/>
+            </a:pPr>
+            <a:r>
+              <a:rPr lang="en-IN" dirty="0" smtClean="0">
+                <a:latin typeface="Courier New" pitchFamily="49" charset="0"/>
+                <a:cs typeface="Courier New" pitchFamily="49" charset="0"/>
+              </a:rPr>
+              <a:t>  </a:t>
+            </a:r>
+            <a:r>
+              <a:rPr lang="en-IN" dirty="0" smtClean="0">
+                <a:latin typeface="Courier New" pitchFamily="49" charset="0"/>
+                <a:cs typeface="Courier New" pitchFamily="49" charset="0"/>
+              </a:rPr>
+              <a:t>)</a:t>
+            </a:r>
+          </a:p>
+          <a:p>
+            <a:r>
+              <a:rPr lang="en-IN" sz="3100" dirty="0" smtClean="0"/>
+              <a:t>Convert function based approach to </a:t>
+            </a:r>
+            <a:r>
+              <a:rPr lang="en-IN" sz="3100" dirty="0" smtClean="0"/>
+              <a:t>class</a:t>
+            </a:r>
+          </a:p>
+          <a:p>
+            <a:r>
+              <a:rPr lang="en-IN" sz="3100" dirty="0" smtClean="0"/>
+              <a:t>Class component must be a </a:t>
+            </a:r>
+            <a:r>
+              <a:rPr lang="en-IN" sz="3100" dirty="0" err="1" smtClean="0"/>
+              <a:t>javascript</a:t>
+            </a:r>
+            <a:r>
+              <a:rPr lang="en-IN" sz="3100" dirty="0" smtClean="0"/>
+              <a:t> class, must extend subclass </a:t>
+            </a:r>
+            <a:r>
+              <a:rPr lang="en-IN" sz="3100" dirty="0" err="1" smtClean="0"/>
+              <a:t>React.Component</a:t>
+            </a:r>
+            <a:r>
+              <a:rPr lang="en-IN" sz="3100" dirty="0" smtClean="0"/>
+              <a:t> and must define a render method that return </a:t>
+            </a:r>
+            <a:r>
+              <a:rPr lang="en-IN" sz="3100" smtClean="0"/>
+              <a:t>jsx</a:t>
+            </a:r>
+            <a:endParaRPr lang="en-IN" sz="3100" dirty="0" smtClean="0"/>
+          </a:p>
+          <a:p>
+            <a:endParaRPr lang="en-IN" dirty="0"/>
           </a:p>
         </p:txBody>
       </p:sp>

</xml_diff>

<commit_message>
Coverted seasons application from function to class based approach
</commit_message>
<xml_diff>
--- a/reactjs.pptx
+++ b/reactjs.pptx
@@ -4881,7 +4881,7 @@
         <p:spPr/>
         <p:txBody>
           <a:bodyPr>
-            <a:normAutofit fontScale="62500" lnSpcReduction="20000"/>
+            <a:normAutofit fontScale="47500" lnSpcReduction="20000"/>
           </a:bodyPr>
           <a:lstStyle/>
           <a:p>
@@ -4909,11 +4909,7 @@
             </a:r>
             <a:r>
               <a:rPr lang="en-IN" dirty="0" smtClean="0"/>
-              <a:t> in index.html </a:t>
-            </a:r>
-            <a:r>
-              <a:rPr lang="en-IN" dirty="0" smtClean="0"/>
-              <a:t>file</a:t>
+              <a:t> in index.html file</a:t>
             </a:r>
           </a:p>
           <a:p>
@@ -5016,24 +5012,13 @@
                 <a:latin typeface="Courier New" pitchFamily="49" charset="0"/>
                 <a:cs typeface="Courier New" pitchFamily="49" charset="0"/>
               </a:rPr>
-              <a:t>  </a:t>
-            </a:r>
-            <a:r>
-              <a:rPr lang="en-IN" dirty="0" smtClean="0">
-                <a:latin typeface="Courier New" pitchFamily="49" charset="0"/>
-                <a:cs typeface="Courier New" pitchFamily="49" charset="0"/>
-              </a:rPr>
-              <a:t>)</a:t>
+              <a:t>  )</a:t>
             </a:r>
           </a:p>
           <a:p>
             <a:r>
               <a:rPr lang="en-IN" sz="3100" dirty="0" smtClean="0"/>
-              <a:t>Convert function based approach to </a:t>
-            </a:r>
-            <a:r>
-              <a:rPr lang="en-IN" sz="3100" dirty="0" smtClean="0"/>
-              <a:t>class</a:t>
+              <a:t>Convert function based approach to class</a:t>
             </a:r>
           </a:p>
           <a:p>
@@ -5058,9 +5043,69 @@
               <a:t> and must define a render method that return </a:t>
             </a:r>
             <a:r>
+              <a:rPr lang="en-IN" sz="3100" dirty="0" err="1" smtClean="0"/>
+              <a:t>jsx</a:t>
+            </a:r>
+            <a:endParaRPr lang="en-IN" sz="3100" dirty="0" smtClean="0"/>
+          </a:p>
+          <a:p>
+            <a:r>
+              <a:rPr lang="en-IN" sz="3100" dirty="0" smtClean="0"/>
+              <a:t>Create state system to read latitude value</a:t>
+            </a:r>
+          </a:p>
+          <a:p>
+            <a:r>
+              <a:rPr lang="en-IN" sz="3100" dirty="0" smtClean="0"/>
+              <a:t>Initialize state in constructor method </a:t>
+            </a:r>
+            <a:r>
+              <a:rPr lang="en-IN" sz="3100" dirty="0" err="1" smtClean="0"/>
+              <a:t>this.state</a:t>
+            </a:r>
+            <a:r>
+              <a:rPr lang="en-IN" sz="3100" dirty="0" smtClean="0"/>
+              <a:t> </a:t>
+            </a:r>
+            <a:r>
+              <a:rPr lang="en-IN" sz="3100" dirty="0" smtClean="0"/>
+              <a:t>= {} in constructor</a:t>
+            </a:r>
+          </a:p>
+          <a:p>
+            <a:r>
+              <a:rPr lang="en-IN" sz="3100" dirty="0" smtClean="0"/>
+              <a:t>Set latitude value by using </a:t>
+            </a:r>
+            <a:r>
+              <a:rPr lang="en-IN" sz="3100" dirty="0" err="1" smtClean="0"/>
+              <a:t>this.setState</a:t>
+            </a:r>
+            <a:r>
+              <a:rPr lang="en-IN" sz="3100" dirty="0" smtClean="0"/>
+              <a:t> method and pass </a:t>
+            </a:r>
+            <a:r>
+              <a:rPr lang="en-IN" sz="3100" dirty="0" err="1" smtClean="0"/>
+              <a:t>latitute</a:t>
+            </a:r>
+            <a:r>
+              <a:rPr lang="en-IN" sz="3100" dirty="0" smtClean="0"/>
+              <a:t> value in it</a:t>
+            </a:r>
+          </a:p>
+          <a:p>
+            <a:r>
+              <a:rPr lang="en-IN" sz="3100" dirty="0" smtClean="0"/>
+              <a:t>Display error message </a:t>
+            </a:r>
+            <a:r>
               <a:rPr lang="en-IN" sz="3100" smtClean="0"/>
-              <a:t>jsx</a:t>
-            </a:r>
+              <a:t>with condition</a:t>
+            </a:r>
+            <a:endParaRPr lang="en-IN" sz="3100" smtClean="0"/>
+          </a:p>
+          <a:p>
             <a:endParaRPr lang="en-IN" sz="3100" dirty="0" smtClean="0"/>
           </a:p>
           <a:p>

</xml_diff>